<commit_message>
Minor addition to status slides.
</commit_message>
<xml_diff>
--- a/doc/tunnelk Status - 2012-03-15.pptx
+++ b/doc/tunnelk Status - 2012-03-15.pptx
@@ -518,11 +518,11 @@
         </c:dLbls>
         <c:marker val="1"/>
         <c:smooth val="0"/>
-        <c:axId val="92155904"/>
-        <c:axId val="92158208"/>
+        <c:axId val="139371648"/>
+        <c:axId val="139373184"/>
       </c:lineChart>
       <c:dateAx>
-        <c:axId val="92155904"/>
+        <c:axId val="139371648"/>
         <c:scaling>
           <c:orientation val="minMax"/>
         </c:scaling>
@@ -532,7 +532,7 @@
         <c:majorTickMark val="out"/>
         <c:minorTickMark val="none"/>
         <c:tickLblPos val="nextTo"/>
-        <c:crossAx val="92158208"/>
+        <c:crossAx val="139373184"/>
         <c:crosses val="autoZero"/>
         <c:auto val="1"/>
         <c:lblOffset val="100"/>
@@ -541,7 +541,7 @@
         <c:majorTimeUnit val="days"/>
       </c:dateAx>
       <c:valAx>
-        <c:axId val="92158208"/>
+        <c:axId val="139373184"/>
         <c:scaling>
           <c:orientation val="minMax"/>
         </c:scaling>
@@ -552,7 +552,7 @@
         <c:majorTickMark val="out"/>
         <c:minorTickMark val="none"/>
         <c:tickLblPos val="nextTo"/>
-        <c:crossAx val="92155904"/>
+        <c:crossAx val="139371648"/>
         <c:crosses val="autoZero"/>
         <c:crossBetween val="between"/>
       </c:valAx>
@@ -781,11 +781,11 @@
         </c:dLbls>
         <c:marker val="1"/>
         <c:smooth val="0"/>
-        <c:axId val="89244032"/>
-        <c:axId val="89245952"/>
+        <c:axId val="139424512"/>
+        <c:axId val="139426048"/>
       </c:lineChart>
       <c:dateAx>
-        <c:axId val="89244032"/>
+        <c:axId val="139424512"/>
         <c:scaling>
           <c:orientation val="minMax"/>
         </c:scaling>
@@ -805,7 +805,7 @@
             <a:endParaRPr lang="en-US"/>
           </a:p>
         </c:txPr>
-        <c:crossAx val="89245952"/>
+        <c:crossAx val="139426048"/>
         <c:crosses val="autoZero"/>
         <c:auto val="1"/>
         <c:lblOffset val="100"/>
@@ -814,7 +814,7 @@
         <c:majorTimeUnit val="days"/>
       </c:dateAx>
       <c:valAx>
-        <c:axId val="89245952"/>
+        <c:axId val="139426048"/>
         <c:scaling>
           <c:orientation val="minMax"/>
         </c:scaling>
@@ -825,7 +825,7 @@
         <c:majorTickMark val="out"/>
         <c:minorTickMark val="none"/>
         <c:tickLblPos val="nextTo"/>
-        <c:crossAx val="89244032"/>
+        <c:crossAx val="139424512"/>
         <c:crosses val="autoZero"/>
         <c:crossBetween val="between"/>
       </c:valAx>
@@ -970,11 +970,11 @@
         </c:dLbls>
         <c:marker val="1"/>
         <c:smooth val="0"/>
-        <c:axId val="91306624"/>
-        <c:axId val="91378432"/>
+        <c:axId val="139454336"/>
+        <c:axId val="139455872"/>
       </c:lineChart>
       <c:dateAx>
-        <c:axId val="91306624"/>
+        <c:axId val="139454336"/>
         <c:scaling>
           <c:orientation val="minMax"/>
         </c:scaling>
@@ -984,7 +984,7 @@
         <c:majorTickMark val="out"/>
         <c:minorTickMark val="none"/>
         <c:tickLblPos val="nextTo"/>
-        <c:crossAx val="91378432"/>
+        <c:crossAx val="139455872"/>
         <c:crosses val="autoZero"/>
         <c:auto val="1"/>
         <c:lblOffset val="100"/>
@@ -993,7 +993,7 @@
         <c:majorTimeUnit val="days"/>
       </c:dateAx>
       <c:valAx>
-        <c:axId val="91378432"/>
+        <c:axId val="139455872"/>
         <c:scaling>
           <c:orientation val="minMax"/>
           <c:min val="80"/>
@@ -1005,7 +1005,7 @@
         <c:majorTickMark val="out"/>
         <c:minorTickMark val="none"/>
         <c:tickLblPos val="nextTo"/>
-        <c:crossAx val="91306624"/>
+        <c:crossAx val="139454336"/>
         <c:crosses val="autoZero"/>
         <c:crossBetween val="between"/>
       </c:valAx>
@@ -1419,11 +1419,11 @@
         </c:dLbls>
         <c:marker val="1"/>
         <c:smooth val="0"/>
-        <c:axId val="91421312"/>
-        <c:axId val="91488640"/>
+        <c:axId val="139513216"/>
+        <c:axId val="139523200"/>
       </c:lineChart>
       <c:dateAx>
-        <c:axId val="91421312"/>
+        <c:axId val="139513216"/>
         <c:scaling>
           <c:orientation val="minMax"/>
         </c:scaling>
@@ -1433,7 +1433,7 @@
         <c:majorTickMark val="out"/>
         <c:minorTickMark val="none"/>
         <c:tickLblPos val="nextTo"/>
-        <c:crossAx val="91488640"/>
+        <c:crossAx val="139523200"/>
         <c:crosses val="autoZero"/>
         <c:auto val="1"/>
         <c:lblOffset val="100"/>
@@ -1442,7 +1442,7 @@
         <c:majorTimeUnit val="days"/>
       </c:dateAx>
       <c:valAx>
-        <c:axId val="91488640"/>
+        <c:axId val="139523200"/>
         <c:scaling>
           <c:orientation val="minMax"/>
         </c:scaling>
@@ -1453,7 +1453,7 @@
         <c:majorTickMark val="out"/>
         <c:minorTickMark val="none"/>
         <c:tickLblPos val="nextTo"/>
-        <c:crossAx val="91421312"/>
+        <c:crossAx val="139513216"/>
         <c:crosses val="autoZero"/>
         <c:crossBetween val="between"/>
       </c:valAx>
@@ -5469,8 +5469,24 @@
             </a:r>
             <a:r>
               <a:rPr lang="en-US" dirty="0" smtClean="0"/>
-              <a:t> communication classes</a:t>
-            </a:r>
+              <a:t> communication </a:t>
+            </a:r>
+            <a:r>
+              <a:rPr lang="en-US" dirty="0" smtClean="0"/>
+              <a:t>classes</a:t>
+            </a:r>
+          </a:p>
+          <a:p>
+            <a:pPr lvl="1"/>
+            <a:r>
+              <a:rPr lang="en-US" dirty="0" smtClean="0"/>
+              <a:t>Added </a:t>
+            </a:r>
+            <a:r>
+              <a:rPr lang="en-US" smtClean="0"/>
+              <a:t>narration capability</a:t>
+            </a:r>
+            <a:endParaRPr lang="en-US" dirty="0" smtClean="0"/>
           </a:p>
           <a:p>
             <a:pPr lvl="1"/>
@@ -6356,14 +6372,6 @@
                         </a:rPr>
                         <a:t>7143</a:t>
                       </a:r>
-                      <a:endParaRPr lang="en-US" sz="1800" kern="1200" dirty="0" smtClean="0">
-                        <a:solidFill>
-                          <a:schemeClr val="tx1"/>
-                        </a:solidFill>
-                        <a:latin typeface="+mn-lt"/>
-                        <a:ea typeface="+mn-ea"/>
-                        <a:cs typeface="+mn-cs"/>
-                      </a:endParaRPr>
                     </a:p>
                   </a:txBody>
                   <a:tcPr/>

</xml_diff>

<commit_message>
Corrected file count in metrics spreadsheet and status slides.
</commit_message>
<xml_diff>
--- a/doc/tunnelk Status - 2012-03-15.pptx
+++ b/doc/tunnelk Status - 2012-03-15.pptx
@@ -126,24 +126,12 @@
 
 <file path=ppt/charts/chart1.xml><?xml version="1.0" encoding="utf-8"?>
 <c:chartSpace xmlns:c="http://schemas.openxmlformats.org/drawingml/2006/chart" xmlns:a="http://schemas.openxmlformats.org/drawingml/2006/main" xmlns:r="http://schemas.openxmlformats.org/officeDocument/2006/relationships">
-  <c:date1904 val="0"/>
   <c:lang val="en-US"/>
-  <c:roundedCorners val="0"/>
-  <mc:AlternateContent xmlns:mc="http://schemas.openxmlformats.org/markup-compatibility/2006">
-    <mc:Choice xmlns:c14="http://schemas.microsoft.com/office/drawing/2007/8/2/chart" Requires="c14">
-      <c14:style val="102"/>
-    </mc:Choice>
-    <mc:Fallback>
-      <c:style val="2"/>
-    </mc:Fallback>
-  </mc:AlternateContent>
   <c:chart>
-    <c:autoTitleDeleted val="0"/>
     <c:plotArea>
       <c:layout/>
       <c:lineChart>
         <c:grouping val="standard"/>
-        <c:varyColors val="0"/>
         <c:ser>
           <c:idx val="0"/>
           <c:order val="0"/>
@@ -233,7 +221,6 @@
               </c:numCache>
             </c:numRef>
           </c:val>
-          <c:smooth val="0"/>
         </c:ser>
         <c:ser>
           <c:idx val="1"/>
@@ -324,7 +311,6 @@
               </c:numCache>
             </c:numRef>
           </c:val>
-          <c:smooth val="0"/>
         </c:ser>
         <c:ser>
           <c:idx val="2"/>
@@ -415,7 +401,6 @@
               </c:numCache>
             </c:numRef>
           </c:val>
-          <c:smooth val="0"/>
         </c:ser>
         <c:ser>
           <c:idx val="3"/>
@@ -506,33 +491,21 @@
               </c:numCache>
             </c:numRef>
           </c:val>
-          <c:smooth val="0"/>
         </c:ser>
-        <c:dLbls>
-          <c:showLegendKey val="0"/>
-          <c:showVal val="0"/>
-          <c:showCatName val="0"/>
-          <c:showSerName val="0"/>
-          <c:showPercent val="0"/>
-          <c:showBubbleSize val="0"/>
-        </c:dLbls>
+        <c:dLbls/>
         <c:marker val="1"/>
-        <c:smooth val="0"/>
-        <c:axId val="139371648"/>
-        <c:axId val="139373184"/>
+        <c:axId val="49225088"/>
+        <c:axId val="49255552"/>
       </c:lineChart>
       <c:dateAx>
-        <c:axId val="139371648"/>
+        <c:axId val="49225088"/>
         <c:scaling>
           <c:orientation val="minMax"/>
         </c:scaling>
-        <c:delete val="0"/>
         <c:axPos val="b"/>
         <c:numFmt formatCode="m/d/yyyy" sourceLinked="1"/>
-        <c:majorTickMark val="out"/>
-        <c:minorTickMark val="none"/>
         <c:tickLblPos val="nextTo"/>
-        <c:crossAx val="139373184"/>
+        <c:crossAx val="49255552"/>
         <c:crosses val="autoZero"/>
         <c:auto val="1"/>
         <c:lblOffset val="100"/>
@@ -541,18 +514,15 @@
         <c:majorTimeUnit val="days"/>
       </c:dateAx>
       <c:valAx>
-        <c:axId val="139373184"/>
+        <c:axId val="49255552"/>
         <c:scaling>
           <c:orientation val="minMax"/>
         </c:scaling>
-        <c:delete val="0"/>
         <c:axPos val="l"/>
         <c:majorGridlines/>
         <c:numFmt formatCode="General" sourceLinked="1"/>
-        <c:majorTickMark val="out"/>
-        <c:minorTickMark val="none"/>
         <c:tickLblPos val="nextTo"/>
-        <c:crossAx val="139371648"/>
+        <c:crossAx val="49225088"/>
         <c:crosses val="autoZero"/>
         <c:crossBetween val="between"/>
       </c:valAx>
@@ -563,44 +533,28 @@
         <c:manualLayout>
           <c:xMode val="edge"/>
           <c:yMode val="edge"/>
-          <c:x val="0.66823091247672339"/>
-          <c:y val="4.3679125262180603E-2"/>
-          <c:w val="0.30569832402234609"/>
-          <c:h val="0.90681933317287322"/>
+          <c:x val="0.66823091247672362"/>
+          <c:y val="4.3679125262180589E-2"/>
+          <c:w val="0.30569832402234615"/>
+          <c:h val="0.90681933317287333"/>
         </c:manualLayout>
       </c:layout>
-      <c:overlay val="0"/>
     </c:legend>
     <c:plotVisOnly val="1"/>
     <c:dispBlanksAs val="gap"/>
-    <c:showDLblsOverMax val="0"/>
   </c:chart>
-  <c:externalData r:id="rId1">
-    <c:autoUpdate val="0"/>
-  </c:externalData>
+  <c:externalData r:id="rId1"/>
 </c:chartSpace>
 </file>
 
 <file path=ppt/charts/chart2.xml><?xml version="1.0" encoding="utf-8"?>
 <c:chartSpace xmlns:c="http://schemas.openxmlformats.org/drawingml/2006/chart" xmlns:a="http://schemas.openxmlformats.org/drawingml/2006/main" xmlns:r="http://schemas.openxmlformats.org/officeDocument/2006/relationships">
-  <c:date1904 val="0"/>
   <c:lang val="en-US"/>
-  <c:roundedCorners val="0"/>
-  <mc:AlternateContent xmlns:mc="http://schemas.openxmlformats.org/markup-compatibility/2006">
-    <mc:Choice xmlns:c14="http://schemas.microsoft.com/office/drawing/2007/8/2/chart" Requires="c14">
-      <c14:style val="102"/>
-    </mc:Choice>
-    <mc:Fallback>
-      <c:style val="2"/>
-    </mc:Fallback>
-  </mc:AlternateContent>
   <c:chart>
-    <c:autoTitleDeleted val="0"/>
     <c:plotArea>
       <c:layout/>
       <c:lineChart>
         <c:grouping val="standard"/>
-        <c:varyColors val="0"/>
         <c:ser>
           <c:idx val="0"/>
           <c:order val="0"/>
@@ -684,7 +638,6 @@
               </c:numCache>
             </c:numRef>
           </c:val>
-          <c:smooth val="0"/>
         </c:ser>
         <c:ser>
           <c:idx val="1"/>
@@ -769,31 +722,19 @@
               </c:numCache>
             </c:numRef>
           </c:val>
-          <c:smooth val="0"/>
         </c:ser>
-        <c:dLbls>
-          <c:showLegendKey val="0"/>
-          <c:showVal val="0"/>
-          <c:showCatName val="0"/>
-          <c:showSerName val="0"/>
-          <c:showPercent val="0"/>
-          <c:showBubbleSize val="0"/>
-        </c:dLbls>
+        <c:dLbls/>
         <c:marker val="1"/>
-        <c:smooth val="0"/>
-        <c:axId val="139424512"/>
-        <c:axId val="139426048"/>
+        <c:axId val="49320320"/>
+        <c:axId val="49321856"/>
       </c:lineChart>
       <c:dateAx>
-        <c:axId val="139424512"/>
+        <c:axId val="49320320"/>
         <c:scaling>
           <c:orientation val="minMax"/>
         </c:scaling>
-        <c:delete val="0"/>
         <c:axPos val="b"/>
         <c:numFmt formatCode="m/d/yyyy" sourceLinked="1"/>
-        <c:majorTickMark val="out"/>
-        <c:minorTickMark val="none"/>
         <c:tickLblPos val="nextTo"/>
         <c:txPr>
           <a:bodyPr rot="-2700000"/>
@@ -805,7 +746,7 @@
             <a:endParaRPr lang="en-US"/>
           </a:p>
         </c:txPr>
-        <c:crossAx val="139426048"/>
+        <c:crossAx val="49321856"/>
         <c:crosses val="autoZero"/>
         <c:auto val="1"/>
         <c:lblOffset val="100"/>
@@ -814,18 +755,15 @@
         <c:majorTimeUnit val="days"/>
       </c:dateAx>
       <c:valAx>
-        <c:axId val="139426048"/>
+        <c:axId val="49321856"/>
         <c:scaling>
           <c:orientation val="minMax"/>
         </c:scaling>
-        <c:delete val="0"/>
         <c:axPos val="l"/>
         <c:majorGridlines/>
         <c:numFmt formatCode="General" sourceLinked="1"/>
-        <c:majorTickMark val="out"/>
-        <c:minorTickMark val="none"/>
         <c:tickLblPos val="nextTo"/>
-        <c:crossAx val="139424512"/>
+        <c:crossAx val="49320320"/>
         <c:crosses val="autoZero"/>
         <c:crossBetween val="between"/>
       </c:valAx>
@@ -833,42 +771,25 @@
     <c:legend>
       <c:legendPos val="r"/>
       <c:layout/>
-      <c:overlay val="0"/>
     </c:legend>
     <c:plotVisOnly val="1"/>
     <c:dispBlanksAs val="gap"/>
-    <c:showDLblsOverMax val="0"/>
   </c:chart>
-  <c:externalData r:id="rId1">
-    <c:autoUpdate val="0"/>
-  </c:externalData>
+  <c:externalData r:id="rId1"/>
 </c:chartSpace>
 </file>
 
 <file path=ppt/charts/chart3.xml><?xml version="1.0" encoding="utf-8"?>
 <c:chartSpace xmlns:c="http://schemas.openxmlformats.org/drawingml/2006/chart" xmlns:a="http://schemas.openxmlformats.org/drawingml/2006/main" xmlns:r="http://schemas.openxmlformats.org/officeDocument/2006/relationships">
-  <c:date1904 val="0"/>
   <c:lang val="en-US"/>
-  <c:roundedCorners val="0"/>
-  <mc:AlternateContent xmlns:mc="http://schemas.openxmlformats.org/markup-compatibility/2006">
-    <mc:Choice xmlns:c14="http://schemas.microsoft.com/office/drawing/2007/8/2/chart" Requires="c14">
-      <c14:style val="102"/>
-    </mc:Choice>
-    <mc:Fallback>
-      <c:style val="2"/>
-    </mc:Fallback>
-  </mc:AlternateContent>
   <c:chart>
     <c:title>
       <c:layout/>
-      <c:overlay val="0"/>
     </c:title>
-    <c:autoTitleDeleted val="0"/>
     <c:plotArea>
       <c:layout/>
       <c:lineChart>
         <c:grouping val="standard"/>
-        <c:varyColors val="0"/>
         <c:ser>
           <c:idx val="1"/>
           <c:order val="0"/>
@@ -953,38 +874,25 @@
                   <c:v>112</c:v>
                 </c:pt>
                 <c:pt idx="8">
-                  <c:v>112</c:v>
+                  <c:v>116</c:v>
                 </c:pt>
               </c:numCache>
             </c:numRef>
           </c:val>
-          <c:smooth val="0"/>
         </c:ser>
-        <c:dLbls>
-          <c:showLegendKey val="0"/>
-          <c:showVal val="0"/>
-          <c:showCatName val="0"/>
-          <c:showSerName val="0"/>
-          <c:showPercent val="0"/>
-          <c:showBubbleSize val="0"/>
-        </c:dLbls>
         <c:marker val="1"/>
-        <c:smooth val="0"/>
-        <c:axId val="139454336"/>
-        <c:axId val="139455872"/>
+        <c:axId val="57982336"/>
+        <c:axId val="83526400"/>
       </c:lineChart>
       <c:dateAx>
-        <c:axId val="139454336"/>
+        <c:axId val="57982336"/>
         <c:scaling>
           <c:orientation val="minMax"/>
         </c:scaling>
-        <c:delete val="0"/>
         <c:axPos val="b"/>
         <c:numFmt formatCode="m/d/yyyy" sourceLinked="1"/>
-        <c:majorTickMark val="out"/>
-        <c:minorTickMark val="none"/>
         <c:tickLblPos val="nextTo"/>
-        <c:crossAx val="139455872"/>
+        <c:crossAx val="83526400"/>
         <c:crosses val="autoZero"/>
         <c:auto val="1"/>
         <c:lblOffset val="100"/>
@@ -993,19 +901,16 @@
         <c:majorTimeUnit val="days"/>
       </c:dateAx>
       <c:valAx>
-        <c:axId val="139455872"/>
+        <c:axId val="83526400"/>
         <c:scaling>
           <c:orientation val="minMax"/>
           <c:min val="80"/>
         </c:scaling>
-        <c:delete val="0"/>
         <c:axPos val="l"/>
         <c:majorGridlines/>
         <c:numFmt formatCode="General" sourceLinked="1"/>
-        <c:majorTickMark val="out"/>
-        <c:minorTickMark val="none"/>
         <c:tickLblPos val="nextTo"/>
-        <c:crossAx val="139454336"/>
+        <c:crossAx val="57982336"/>
         <c:crosses val="autoZero"/>
         <c:crossBetween val="between"/>
       </c:valAx>
@@ -1013,38 +918,22 @@
     <c:legend>
       <c:legendPos val="r"/>
       <c:layout/>
-      <c:overlay val="0"/>
     </c:legend>
     <c:plotVisOnly val="1"/>
     <c:dispBlanksAs val="gap"/>
-    <c:showDLblsOverMax val="0"/>
   </c:chart>
-  <c:externalData r:id="rId1">
-    <c:autoUpdate val="0"/>
-  </c:externalData>
+  <c:externalData r:id="rId1"/>
 </c:chartSpace>
 </file>
 
 <file path=ppt/charts/chart4.xml><?xml version="1.0" encoding="utf-8"?>
 <c:chartSpace xmlns:c="http://schemas.openxmlformats.org/drawingml/2006/chart" xmlns:a="http://schemas.openxmlformats.org/drawingml/2006/main" xmlns:r="http://schemas.openxmlformats.org/officeDocument/2006/relationships">
-  <c:date1904 val="0"/>
   <c:lang val="en-US"/>
-  <c:roundedCorners val="0"/>
-  <mc:AlternateContent xmlns:mc="http://schemas.openxmlformats.org/markup-compatibility/2006">
-    <mc:Choice xmlns:c14="http://schemas.microsoft.com/office/drawing/2007/8/2/chart" Requires="c14">
-      <c14:style val="102"/>
-    </mc:Choice>
-    <mc:Fallback>
-      <c:style val="2"/>
-    </mc:Fallback>
-  </mc:AlternateContent>
   <c:chart>
-    <c:autoTitleDeleted val="0"/>
     <c:plotArea>
       <c:layout/>
       <c:lineChart>
         <c:grouping val="standard"/>
-        <c:varyColors val="0"/>
         <c:ser>
           <c:idx val="0"/>
           <c:order val="0"/>
@@ -1134,7 +1023,6 @@
               </c:numCache>
             </c:numRef>
           </c:val>
-          <c:smooth val="0"/>
         </c:ser>
         <c:ser>
           <c:idx val="1"/>
@@ -1225,7 +1113,6 @@
               </c:numCache>
             </c:numRef>
           </c:val>
-          <c:smooth val="0"/>
         </c:ser>
         <c:ser>
           <c:idx val="2"/>
@@ -1316,7 +1203,6 @@
               </c:numCache>
             </c:numRef>
           </c:val>
-          <c:smooth val="0"/>
         </c:ser>
         <c:ser>
           <c:idx val="3"/>
@@ -1407,33 +1293,21 @@
               </c:numCache>
             </c:numRef>
           </c:val>
-          <c:smooth val="0"/>
         </c:ser>
-        <c:dLbls>
-          <c:showLegendKey val="0"/>
-          <c:showVal val="0"/>
-          <c:showCatName val="0"/>
-          <c:showSerName val="0"/>
-          <c:showPercent val="0"/>
-          <c:showBubbleSize val="0"/>
-        </c:dLbls>
+        <c:dLbls/>
         <c:marker val="1"/>
-        <c:smooth val="0"/>
-        <c:axId val="139513216"/>
-        <c:axId val="139523200"/>
+        <c:axId val="49711744"/>
+        <c:axId val="49721728"/>
       </c:lineChart>
       <c:dateAx>
-        <c:axId val="139513216"/>
+        <c:axId val="49711744"/>
         <c:scaling>
           <c:orientation val="minMax"/>
         </c:scaling>
-        <c:delete val="0"/>
         <c:axPos val="b"/>
         <c:numFmt formatCode="m/d/yyyy" sourceLinked="1"/>
-        <c:majorTickMark val="out"/>
-        <c:minorTickMark val="none"/>
         <c:tickLblPos val="nextTo"/>
-        <c:crossAx val="139523200"/>
+        <c:crossAx val="49721728"/>
         <c:crosses val="autoZero"/>
         <c:auto val="1"/>
         <c:lblOffset val="100"/>
@@ -1442,18 +1316,15 @@
         <c:majorTimeUnit val="days"/>
       </c:dateAx>
       <c:valAx>
-        <c:axId val="139523200"/>
+        <c:axId val="49721728"/>
         <c:scaling>
           <c:orientation val="minMax"/>
         </c:scaling>
-        <c:delete val="0"/>
         <c:axPos val="l"/>
         <c:majorGridlines/>
         <c:numFmt formatCode="General" sourceLinked="1"/>
-        <c:majorTickMark val="out"/>
-        <c:minorTickMark val="none"/>
         <c:tickLblPos val="nextTo"/>
-        <c:crossAx val="139513216"/>
+        <c:crossAx val="49711744"/>
         <c:crosses val="autoZero"/>
         <c:crossBetween val="between"/>
       </c:valAx>
@@ -1464,21 +1335,17 @@
         <c:manualLayout>
           <c:xMode val="edge"/>
           <c:yMode val="edge"/>
-          <c:x val="0.69662962962963026"/>
+          <c:x val="0.69662962962963049"/>
           <c:y val="6.1146374170477601E-2"/>
-          <c:w val="0.28114814814814792"/>
-          <c:h val="0.86898463019633521"/>
+          <c:w val="0.28114814814814787"/>
+          <c:h val="0.86898463019633532"/>
         </c:manualLayout>
       </c:layout>
-      <c:overlay val="0"/>
     </c:legend>
     <c:plotVisOnly val="1"/>
     <c:dispBlanksAs val="gap"/>
-    <c:showDLblsOverMax val="0"/>
   </c:chart>
-  <c:externalData r:id="rId1">
-    <c:autoUpdate val="0"/>
-  </c:externalData>
+  <c:externalData r:id="rId1"/>
 </c:chartSpace>
 </file>
 
@@ -1641,7 +1508,7 @@
     </p:spTree>
     <p:extLst>
       <p:ext uri="{BB962C8B-B14F-4D97-AF65-F5344CB8AC3E}">
-        <p14:creationId xmlns:p14="http://schemas.microsoft.com/office/powerpoint/2010/main" val="314005109"/>
+        <p14:creationId xmlns:p14="http://schemas.microsoft.com/office/powerpoint/2010/main" xmlns="" val="314005109"/>
       </p:ext>
     </p:extLst>
   </p:cSld>
@@ -1901,7 +1768,7 @@
     </p:spTree>
     <p:extLst>
       <p:ext uri="{BB962C8B-B14F-4D97-AF65-F5344CB8AC3E}">
-        <p14:creationId xmlns:p14="http://schemas.microsoft.com/office/powerpoint/2010/main" val="4019469591"/>
+        <p14:creationId xmlns:p14="http://schemas.microsoft.com/office/powerpoint/2010/main" xmlns="" val="4019469591"/>
       </p:ext>
     </p:extLst>
   </p:cSld>
@@ -2158,7 +2025,7 @@
     </p:spTree>
     <p:extLst>
       <p:ext uri="{BB962C8B-B14F-4D97-AF65-F5344CB8AC3E}">
-        <p14:creationId xmlns:p14="http://schemas.microsoft.com/office/powerpoint/2010/main" val="3459278391"/>
+        <p14:creationId xmlns:p14="http://schemas.microsoft.com/office/powerpoint/2010/main" xmlns="" val="3459278391"/>
       </p:ext>
     </p:extLst>
   </p:cSld>
@@ -2251,7 +2118,7 @@
     </p:spTree>
     <p:extLst>
       <p:ext uri="{BB962C8B-B14F-4D97-AF65-F5344CB8AC3E}">
-        <p14:creationId xmlns:p14="http://schemas.microsoft.com/office/powerpoint/2010/main" val="118783775"/>
+        <p14:creationId xmlns:p14="http://schemas.microsoft.com/office/powerpoint/2010/main" xmlns="" val="118783775"/>
       </p:ext>
     </p:extLst>
   </p:cSld>
@@ -5252,7 +5119,7 @@
           <a:blip r:embed="rId4" cstate="print">
             <a:extLst>
               <a:ext uri="{28A0092B-C50C-407E-A947-70E740481C1C}">
-                <a14:useLocalDpi xmlns:a14="http://schemas.microsoft.com/office/drawing/2010/main" val="0"/>
+                <a14:useLocalDpi xmlns:a14="http://schemas.microsoft.com/office/drawing/2010/main" xmlns="" val="0"/>
               </a:ext>
             </a:extLst>
           </a:blip>
@@ -5469,11 +5336,7 @@
             </a:r>
             <a:r>
               <a:rPr lang="en-US" dirty="0" smtClean="0"/>
-              <a:t> communication </a:t>
-            </a:r>
-            <a:r>
-              <a:rPr lang="en-US" dirty="0" smtClean="0"/>
-              <a:t>classes</a:t>
+              <a:t> communication classes</a:t>
             </a:r>
           </a:p>
           <a:p>
@@ -5524,7 +5387,7 @@
     </p:spTree>
     <p:extLst>
       <p:ext uri="{BB962C8B-B14F-4D97-AF65-F5344CB8AC3E}">
-        <p14:creationId xmlns:p14="http://schemas.microsoft.com/office/powerpoint/2010/main" val="2119256620"/>
+        <p14:creationId xmlns:p14="http://schemas.microsoft.com/office/powerpoint/2010/main" xmlns="" val="2119256620"/>
       </p:ext>
     </p:extLst>
   </p:cSld>
@@ -5616,7 +5479,7 @@
           <p:nvPr>
             <p:extLst>
               <p:ext uri="{D42A27DB-BD31-4B8C-83A1-F6EECF244321}">
-                <p14:modId xmlns:p14="http://schemas.microsoft.com/office/powerpoint/2010/main" val="3329177942"/>
+                <p14:modId xmlns:p14="http://schemas.microsoft.com/office/powerpoint/2010/main" xmlns="" val="3329177942"/>
               </p:ext>
             </p:extLst>
           </p:nvPr>
@@ -6060,7 +5923,7 @@
           <p:nvPr>
             <p:extLst>
               <p:ext uri="{D42A27DB-BD31-4B8C-83A1-F6EECF244321}">
-                <p14:modId xmlns:p14="http://schemas.microsoft.com/office/powerpoint/2010/main" val="3453786943"/>
+                <p14:modId xmlns:p14="http://schemas.microsoft.com/office/powerpoint/2010/main" xmlns="" val="3453786943"/>
               </p:ext>
             </p:extLst>
           </p:nvPr>
@@ -6191,7 +6054,7 @@
           <p:nvPr>
             <p:extLst>
               <p:ext uri="{D42A27DB-BD31-4B8C-83A1-F6EECF244321}">
-                <p14:modId xmlns:p14="http://schemas.microsoft.com/office/powerpoint/2010/main" val="1004166093"/>
+                <p14:modId xmlns:p14="http://schemas.microsoft.com/office/powerpoint/2010/main" xmlns="" val="1004166093"/>
               </p:ext>
             </p:extLst>
           </p:nvPr>
@@ -6437,8 +6300,13 @@
                             <a:schemeClr val="tx1"/>
                           </a:solidFill>
                         </a:rPr>
-                        <a:t>112</a:t>
+                        <a:t>116</a:t>
                       </a:r>
+                      <a:endParaRPr lang="en-US" dirty="0" smtClean="0">
+                        <a:solidFill>
+                          <a:schemeClr val="tx1"/>
+                        </a:solidFill>
+                      </a:endParaRPr>
                     </a:p>
                     <a:p>
                       <a:endParaRPr lang="en-US" dirty="0">
@@ -6534,13 +6402,13 @@
           <p:nvPr>
             <p:extLst>
               <p:ext uri="{D42A27DB-BD31-4B8C-83A1-F6EECF244321}">
-                <p14:modId xmlns:p14="http://schemas.microsoft.com/office/powerpoint/2010/main" val="3448762233"/>
+                <p14:modId xmlns:p14="http://schemas.microsoft.com/office/powerpoint/2010/main" xmlns="" val="3448762233"/>
               </p:ext>
             </p:extLst>
           </p:nvPr>
         </p:nvGraphicFramePr>
         <p:xfrm>
-          <a:off x="914400" y="4038600"/>
+          <a:off x="914400" y="3924300"/>
           <a:ext cx="3295650" cy="2181226"/>
         </p:xfrm>
         <a:graphic>
@@ -6551,20 +6419,12 @@
       </p:graphicFrame>
       <p:graphicFrame>
         <p:nvGraphicFramePr>
-          <p:cNvPr id="10" name="Chart 9"/>
-          <p:cNvGraphicFramePr>
-            <a:graphicFrameLocks/>
-          </p:cNvGraphicFramePr>
-          <p:nvPr>
-            <p:extLst>
-              <p:ext uri="{D42A27DB-BD31-4B8C-83A1-F6EECF244321}">
-                <p14:modId xmlns:p14="http://schemas.microsoft.com/office/powerpoint/2010/main" val="3164767040"/>
-              </p:ext>
-            </p:extLst>
-          </p:nvPr>
+          <p:cNvPr id="9" name="Chart 8"/>
+          <p:cNvGraphicFramePr/>
+          <p:nvPr/>
         </p:nvGraphicFramePr>
         <p:xfrm>
-          <a:off x="4953000" y="3886200"/>
+          <a:off x="4953000" y="3924301"/>
           <a:ext cx="3295650" cy="2181225"/>
         </p:xfrm>
         <a:graphic>
@@ -7183,7 +7043,7 @@
           <p:nvPr>
             <p:extLst>
               <p:ext uri="{D42A27DB-BD31-4B8C-83A1-F6EECF244321}">
-                <p14:modId xmlns:p14="http://schemas.microsoft.com/office/powerpoint/2010/main" val="1102508271"/>
+                <p14:modId xmlns:p14="http://schemas.microsoft.com/office/powerpoint/2010/main" xmlns="" val="1102508271"/>
               </p:ext>
             </p:extLst>
           </p:nvPr>
@@ -7316,7 +7176,7 @@
           <a:blip r:embed="rId4" cstate="print">
             <a:extLst>
               <a:ext uri="{28A0092B-C50C-407E-A947-70E740481C1C}">
-                <a14:useLocalDpi xmlns:a14="http://schemas.microsoft.com/office/drawing/2010/main" val="0"/>
+                <a14:useLocalDpi xmlns:a14="http://schemas.microsoft.com/office/drawing/2010/main" xmlns="" val="0"/>
               </a:ext>
             </a:extLst>
           </a:blip>
@@ -7397,7 +7257,7 @@
     </p:spTree>
     <p:extLst>
       <p:ext uri="{BB962C8B-B14F-4D97-AF65-F5344CB8AC3E}">
-        <p14:creationId xmlns:p14="http://schemas.microsoft.com/office/powerpoint/2010/main" val="4023873032"/>
+        <p14:creationId xmlns:p14="http://schemas.microsoft.com/office/powerpoint/2010/main" xmlns="" val="4023873032"/>
       </p:ext>
     </p:extLst>
   </p:cSld>

</xml_diff>